<commit_message>
Updated file(s) via upload
</commit_message>
<xml_diff>
--- a/DRAFT - Research Capstone Project v1.pptx
+++ b/DRAFT - Research Capstone Project v1.pptx
@@ -10874,14 +10874,14 @@
           <p:nvPr>
             <p:extLst>
               <p:ext uri="{D42A27DB-BD31-4B8C-83A1-F6EECF244321}">
-                <p14:modId xmlns:p14="http://schemas.microsoft.com/office/powerpoint/2010/main" val="86174332"/>
+                <p14:modId xmlns:p14="http://schemas.microsoft.com/office/powerpoint/2010/main" val="2502411842"/>
               </p:ext>
             </p:extLst>
           </p:nvPr>
         </p:nvGraphicFramePr>
         <p:xfrm>
-          <a:off x="3866995" y="3713195"/>
-          <a:ext cx="4458010" cy="1112520"/>
+          <a:off x="3554200" y="3713195"/>
+          <a:ext cx="5083601" cy="1381760"/>
         </p:xfrm>
         <a:graphic>
           <a:graphicData uri="http://schemas.openxmlformats.org/drawingml/2006/table">
@@ -10890,14 +10890,14 @@
                 <a:tableStyleId>{9D7B26C5-4107-4FEC-AEDC-1716B250A1EF}</a:tableStyleId>
               </a:tblPr>
               <a:tblGrid>
-                <a:gridCol w="1569844">
+                <a:gridCol w="1355663">
                   <a:extLst>
                     <a:ext uri="{9D8B030D-6E8A-4147-A177-3AD203B41FA5}">
                       <a16:colId xmlns:a16="http://schemas.microsoft.com/office/drawing/2014/main" val="238460430"/>
                     </a:ext>
                   </a:extLst>
                 </a:gridCol>
-                <a:gridCol w="2888166">
+                <a:gridCol w="3727938">
                   <a:extLst>
                     <a:ext uri="{9D8B030D-6E8A-4147-A177-3AD203B41FA5}">
                       <a16:colId xmlns:a16="http://schemas.microsoft.com/office/drawing/2014/main" val="3672832534"/>
@@ -10954,7 +10954,7 @@
                       </a:r>
                       <a:r>
                         <a:rPr lang="en-CA" dirty="0"/>
-                        <a:t> or </a:t>
+                        <a:t>  or  </a:t>
                       </a:r>
                       <a:r>
                         <a:rPr lang="en-CA" dirty="0">
@@ -11019,7 +11019,7 @@
                       </a:r>
                       <a:r>
                         <a:rPr lang="en-CA" dirty="0"/>
-                        <a:t> (tilde)</a:t>
+                        <a:t>  (tilde)</a:t>
                       </a:r>
                       <a:endParaRPr lang="en-CA" dirty="0">
                         <a:latin typeface="+mn-lt"/>
@@ -11037,7 +11037,7 @@
                     <a:p>
                       <a:r>
                         <a:rPr lang="en-CA" dirty="0"/>
-                        <a:t>Define formula/relationship</a:t>
+                        <a:t>Define formula/relationship between two or more variables.</a:t>
                       </a:r>
                     </a:p>
                   </a:txBody>
@@ -17463,6 +17463,35 @@
           <a:bodyPr/>
           <a:lstStyle/>
           <a:p>
+            <a:pPr marL="514350" indent="-514350">
+              <a:buFont typeface="+mj-lt"/>
+              <a:buAutoNum type="arabicPeriod"/>
+            </a:pPr>
+            <a:r>
+              <a:rPr lang="en-CA" dirty="0"/>
+              <a:t>Bollen, K. A. (1989). </a:t>
+            </a:r>
+            <a:r>
+              <a:rPr lang="en-CA" i="1" dirty="0"/>
+              <a:t>Structural Equations with Latent Variables</a:t>
+            </a:r>
+            <a:r>
+              <a:rPr lang="en-CA" dirty="0"/>
+              <a:t>.</a:t>
+            </a:r>
+            <a:br>
+              <a:rPr lang="en-CA" dirty="0"/>
+            </a:br>
+            <a:r>
+              <a:rPr lang="en-CA" dirty="0"/>
+              <a:t>John Wiley &amp; Sons, Incorporated.</a:t>
+            </a:r>
+          </a:p>
+          <a:p>
+            <a:pPr marL="514350" indent="-514350">
+              <a:buFont typeface="+mj-lt"/>
+              <a:buAutoNum type="arabicPeriod"/>
+            </a:pPr>
             <a:r>
               <a:rPr lang="en-CA" dirty="0"/>
               <a:t>Lin, J. (2024). </a:t>
@@ -18450,8 +18479,8 @@
           </a:p>
         </p:txBody>
       </p:sp>
-      <mc:AlternateContent xmlns:mc="http://schemas.openxmlformats.org/markup-compatibility/2006" xmlns:a14="http://schemas.microsoft.com/office/drawing/2010/main">
-        <mc:Choice Requires="a14">
+      <mc:AlternateContent xmlns:mc="http://schemas.openxmlformats.org/markup-compatibility/2006">
+        <mc:Choice xmlns:a14="http://schemas.microsoft.com/office/drawing/2010/main" Requires="a14">
           <p:sp>
             <p:nvSpPr>
               <p:cNvPr id="3" name="Content Placeholder 2">
@@ -18518,15 +18547,7 @@
                 </a:pPr>
                 <a:r>
                   <a:rPr lang="en-CA" dirty="0"/>
-                  <a:t>Often referred to as “</a:t>
-                </a:r>
-                <a:r>
-                  <a:rPr lang="en-CA" i="1" dirty="0"/>
-                  <a:t>independent</a:t>
-                </a:r>
-                <a:r>
-                  <a:rPr lang="en-CA" dirty="0"/>
-                  <a:t>” variables (denoted as </a:t>
+                  <a:t>Often referred to as “independent” variables (denoted as </a:t>
                 </a:r>
                 <a14:m>
                   <m:oMath xmlns:m="http://schemas.openxmlformats.org/officeDocument/2006/math">
@@ -18619,23 +18640,7 @@
                       <a:schemeClr val="tx1"/>
                     </a:solidFill>
                   </a:rPr>
-                  <a:t>Variables that are expressed as a function of one or more other variables; they exist “</a:t>
-                </a:r>
-                <a:r>
-                  <a:rPr lang="en-CA" i="1" dirty="0">
-                    <a:solidFill>
-                      <a:schemeClr val="tx1"/>
-                    </a:solidFill>
-                  </a:rPr>
-                  <a:t>inside</a:t>
-                </a:r>
-                <a:r>
-                  <a:rPr lang="en-CA" dirty="0">
-                    <a:solidFill>
-                      <a:schemeClr val="tx1"/>
-                    </a:solidFill>
-                  </a:rPr>
-                  <a:t>” the system of variables under study.</a:t>
+                  <a:t>Variables that are expressed as a function of one or more other variables; they exist “inside” the system of variables under study.</a:t>
                 </a:r>
               </a:p>
               <a:p>
@@ -18646,15 +18651,7 @@
                 </a:pPr>
                 <a:r>
                   <a:rPr lang="en-CA" dirty="0"/>
-                  <a:t>Often referred to as “</a:t>
-                </a:r>
-                <a:r>
-                  <a:rPr lang="en-CA" i="1" dirty="0"/>
-                  <a:t>dependent</a:t>
-                </a:r>
-                <a:r>
-                  <a:rPr lang="en-CA" dirty="0"/>
-                  <a:t>” variables (denoted as </a:t>
+                  <a:t>Often referred to as “dependent” variables (denoted as </a:t>
                 </a:r>
                 <a14:m>
                   <m:oMath xmlns:m="http://schemas.openxmlformats.org/officeDocument/2006/math">
@@ -18737,7 +18734,7 @@
             </p:txBody>
           </p:sp>
         </mc:Choice>
-        <mc:Fallback xmlns="">
+        <mc:Fallback>
           <p:sp>
             <p:nvSpPr>
               <p:cNvPr id="3" name="Content Placeholder 2">
@@ -18871,8 +18868,8 @@
           </a:p>
         </p:txBody>
       </p:sp>
-      <mc:AlternateContent xmlns:mc="http://schemas.openxmlformats.org/markup-compatibility/2006" xmlns:a14="http://schemas.microsoft.com/office/drawing/2010/main">
-        <mc:Choice Requires="a14">
+      <mc:AlternateContent xmlns:mc="http://schemas.openxmlformats.org/markup-compatibility/2006">
+        <mc:Choice xmlns:a14="http://schemas.microsoft.com/office/drawing/2010/main" Requires="a14">
           <p:sp>
             <p:nvSpPr>
               <p:cNvPr id="3" name="Content Placeholder 2">
@@ -18919,7 +18916,7 @@
                 <a:pPr lvl="1"/>
                 <a:r>
                   <a:rPr lang="en-CA" dirty="0"/>
-                  <a:t>Examples: </a:t>
+                  <a:t>Example: </a:t>
                 </a:r>
                 <a:r>
                   <a:rPr lang="en-CA" dirty="0">
@@ -19051,7 +19048,7 @@
             </p:txBody>
           </p:sp>
         </mc:Choice>
-        <mc:Fallback xmlns="">
+        <mc:Fallback>
           <p:sp>
             <p:nvSpPr>
               <p:cNvPr id="3" name="Content Placeholder 2">

</xml_diff>